<commit_message>
Novos recursos para o relatório.
</commit_message>
<xml_diff>
--- a/recursos/gráficos.pptx
+++ b/recursos/gráficos.pptx
@@ -5,8 +5,8 @@
     <p:sldMasterId id="2147483648" r:id="rId1"/>
   </p:sldMasterIdLst>
   <p:sldIdLst>
-    <p:sldId id="259" r:id="rId2"/>
-    <p:sldId id="258" r:id="rId3"/>
+    <p:sldId id="258" r:id="rId2"/>
+    <p:sldId id="260" r:id="rId3"/>
   </p:sldIdLst>
   <p:sldSz cx="12192000" cy="6858000"/>
   <p:notesSz cx="6858000" cy="9144000"/>
@@ -105,434 +105,15 @@
       </a:defRPr>
     </a:lvl9pPr>
   </p:defaultTextStyle>
+  <p:extLst>
+    <p:ext uri="{EFAFB233-063F-42B5-8137-9DF3F51BA10A}">
+      <p15:sldGuideLst xmlns:p15="http://schemas.microsoft.com/office/powerpoint/2012/main"/>
+    </p:ext>
+  </p:extLst>
 </p:presentation>
 </file>
 
 <file path=ppt/charts/chart1.xml><?xml version="1.0" encoding="utf-8"?>
-<c:chartSpace xmlns:c="http://schemas.openxmlformats.org/drawingml/2006/chart" xmlns:a="http://schemas.openxmlformats.org/drawingml/2006/main" xmlns:r="http://schemas.openxmlformats.org/officeDocument/2006/relationships" xmlns:c16r2="http://schemas.microsoft.com/office/drawing/2015/06/chart">
-  <c:date1904 val="0"/>
-  <c:lang val="pt-BR"/>
-  <c:roundedCorners val="0"/>
-  <mc:AlternateContent xmlns:mc="http://schemas.openxmlformats.org/markup-compatibility/2006">
-    <mc:Choice xmlns:c14="http://schemas.microsoft.com/office/drawing/2007/8/2/chart" Requires="c14">
-      <c14:style val="102"/>
-    </mc:Choice>
-    <mc:Fallback>
-      <c:style val="2"/>
-    </mc:Fallback>
-  </mc:AlternateContent>
-  <c:chart>
-    <c:title>
-      <c:overlay val="0"/>
-      <c:spPr>
-        <a:noFill/>
-        <a:ln>
-          <a:noFill/>
-        </a:ln>
-        <a:effectLst/>
-      </c:spPr>
-      <c:txPr>
-        <a:bodyPr rot="0" spcFirstLastPara="1" vertOverflow="ellipsis" vert="horz" wrap="square" anchor="ctr" anchorCtr="1"/>
-        <a:lstStyle/>
-        <a:p>
-          <a:pPr>
-            <a:defRPr sz="1862" b="0" i="0" u="none" strike="noStrike" kern="1200" spc="0" baseline="0">
-              <a:solidFill>
-                <a:schemeClr val="tx1">
-                  <a:lumMod val="65000"/>
-                  <a:lumOff val="35000"/>
-                </a:schemeClr>
-              </a:solidFill>
-              <a:latin typeface="+mn-lt"/>
-              <a:ea typeface="+mn-ea"/>
-              <a:cs typeface="+mn-cs"/>
-            </a:defRPr>
-          </a:pPr>
-          <a:endParaRPr lang="pt-BR"/>
-        </a:p>
-      </c:txPr>
-    </c:title>
-    <c:autoTitleDeleted val="0"/>
-    <c:plotArea>
-      <c:layout/>
-      <c:barChart>
-        <c:barDir val="col"/>
-        <c:grouping val="clustered"/>
-        <c:varyColors val="0"/>
-        <c:ser>
-          <c:idx val="0"/>
-          <c:order val="0"/>
-          <c:tx>
-            <c:strRef>
-              <c:f>Planilha1!$B$1</c:f>
-              <c:strCache>
-                <c:ptCount val="1"/>
-                <c:pt idx="0">
-                  <c:v>Linguagem C</c:v>
-                </c:pt>
-              </c:strCache>
-            </c:strRef>
-          </c:tx>
-          <c:spPr>
-            <a:solidFill>
-              <a:schemeClr val="accent1"/>
-            </a:solidFill>
-            <a:ln>
-              <a:noFill/>
-            </a:ln>
-            <a:effectLst/>
-          </c:spPr>
-          <c:invertIfNegative val="0"/>
-          <c:cat>
-            <c:numRef>
-              <c:f>Planilha1!$A$2:$A$8</c:f>
-              <c:numCache>
-                <c:formatCode>General</c:formatCode>
-                <c:ptCount val="7"/>
-                <c:pt idx="0">
-                  <c:v>10</c:v>
-                </c:pt>
-                <c:pt idx="1">
-                  <c:v>50</c:v>
-                </c:pt>
-                <c:pt idx="2">
-                  <c:v>100</c:v>
-                </c:pt>
-                <c:pt idx="3">
-                  <c:v>500</c:v>
-                </c:pt>
-                <c:pt idx="4">
-                  <c:v>1000</c:v>
-                </c:pt>
-                <c:pt idx="5">
-                  <c:v>5000</c:v>
-                </c:pt>
-                <c:pt idx="6">
-                  <c:v>10000</c:v>
-                </c:pt>
-              </c:numCache>
-            </c:numRef>
-          </c:cat>
-          <c:val>
-            <c:numRef>
-              <c:f>Planilha1!$B$2:$B$8</c:f>
-              <c:numCache>
-                <c:formatCode>0.000000</c:formatCode>
-                <c:ptCount val="7"/>
-                <c:pt idx="0">
-                  <c:v>5.2499999999999997E-6</c:v>
-                </c:pt>
-                <c:pt idx="1">
-                  <c:v>4.7100000000000001E-4</c:v>
-                </c:pt>
-                <c:pt idx="2">
-                  <c:v>3.718E-3</c:v>
-                </c:pt>
-                <c:pt idx="3">
-                  <c:v>0.58710649999999998</c:v>
-                </c:pt>
-                <c:pt idx="4">
-                  <c:v>5.81701275</c:v>
-                </c:pt>
-                <c:pt idx="5">
-                  <c:v>1717.8830367500002</c:v>
-                </c:pt>
-                <c:pt idx="6">
-                  <c:v>26347.475992250002</c:v>
-                </c:pt>
-              </c:numCache>
-            </c:numRef>
-          </c:val>
-          <c:extLst>
-            <c:ext xmlns:c16="http://schemas.microsoft.com/office/drawing/2014/chart" uri="{C3380CC4-5D6E-409C-BE32-E72D297353CC}">
-              <c16:uniqueId val="{00000000-A134-412A-9506-94F7AD37F573}"/>
-            </c:ext>
-          </c:extLst>
-        </c:ser>
-        <c:ser>
-          <c:idx val="1"/>
-          <c:order val="1"/>
-          <c:tx>
-            <c:strRef>
-              <c:f>Planilha1!$C$1</c:f>
-              <c:strCache>
-                <c:ptCount val="1"/>
-                <c:pt idx="0">
-                  <c:v>Linguagem Assembly</c:v>
-                </c:pt>
-              </c:strCache>
-            </c:strRef>
-          </c:tx>
-          <c:spPr>
-            <a:solidFill>
-              <a:schemeClr val="accent2"/>
-            </a:solidFill>
-            <a:ln>
-              <a:noFill/>
-            </a:ln>
-            <a:effectLst/>
-          </c:spPr>
-          <c:invertIfNegative val="0"/>
-          <c:cat>
-            <c:numRef>
-              <c:f>Planilha1!$A$2:$A$8</c:f>
-              <c:numCache>
-                <c:formatCode>General</c:formatCode>
-                <c:ptCount val="7"/>
-                <c:pt idx="0">
-                  <c:v>10</c:v>
-                </c:pt>
-                <c:pt idx="1">
-                  <c:v>50</c:v>
-                </c:pt>
-                <c:pt idx="2">
-                  <c:v>100</c:v>
-                </c:pt>
-                <c:pt idx="3">
-                  <c:v>500</c:v>
-                </c:pt>
-                <c:pt idx="4">
-                  <c:v>1000</c:v>
-                </c:pt>
-                <c:pt idx="5">
-                  <c:v>5000</c:v>
-                </c:pt>
-                <c:pt idx="6">
-                  <c:v>10000</c:v>
-                </c:pt>
-              </c:numCache>
-            </c:numRef>
-          </c:cat>
-          <c:val>
-            <c:numRef>
-              <c:f>Planilha1!$C$2:$C$8</c:f>
-              <c:numCache>
-                <c:formatCode>0.000000</c:formatCode>
-                <c:ptCount val="7"/>
-                <c:pt idx="0">
-                  <c:v>3.2500000000000002E-6</c:v>
-                </c:pt>
-                <c:pt idx="1">
-                  <c:v>2.745E-4</c:v>
-                </c:pt>
-                <c:pt idx="2">
-                  <c:v>2.2432500000000005E-3</c:v>
-                </c:pt>
-                <c:pt idx="3">
-                  <c:v>0.30316799999999999</c:v>
-                </c:pt>
-                <c:pt idx="4">
-                  <c:v>2.6423200000000002</c:v>
-                </c:pt>
-                <c:pt idx="5">
-                  <c:v>1381.6739632499998</c:v>
-                </c:pt>
-                <c:pt idx="6">
-                  <c:v>20201.051937000004</c:v>
-                </c:pt>
-              </c:numCache>
-            </c:numRef>
-          </c:val>
-          <c:extLst>
-            <c:ext xmlns:c16="http://schemas.microsoft.com/office/drawing/2014/chart" uri="{C3380CC4-5D6E-409C-BE32-E72D297353CC}">
-              <c16:uniqueId val="{00000001-A134-412A-9506-94F7AD37F573}"/>
-            </c:ext>
-          </c:extLst>
-        </c:ser>
-        <c:dLbls>
-          <c:showLegendKey val="0"/>
-          <c:showVal val="0"/>
-          <c:showCatName val="0"/>
-          <c:showSerName val="0"/>
-          <c:showPercent val="0"/>
-          <c:showBubbleSize val="0"/>
-        </c:dLbls>
-        <c:gapWidth val="219"/>
-        <c:overlap val="-27"/>
-        <c:axId val="67531663"/>
-        <c:axId val="67523759"/>
-      </c:barChart>
-      <c:catAx>
-        <c:axId val="67531663"/>
-        <c:scaling>
-          <c:orientation val="minMax"/>
-        </c:scaling>
-        <c:delete val="0"/>
-        <c:axPos val="b"/>
-        <c:numFmt formatCode="General" sourceLinked="1"/>
-        <c:majorTickMark val="none"/>
-        <c:minorTickMark val="none"/>
-        <c:tickLblPos val="nextTo"/>
-        <c:spPr>
-          <a:noFill/>
-          <a:ln w="9525" cap="flat" cmpd="sng" algn="ctr">
-            <a:solidFill>
-              <a:schemeClr val="tx1">
-                <a:lumMod val="15000"/>
-                <a:lumOff val="85000"/>
-              </a:schemeClr>
-            </a:solidFill>
-            <a:round/>
-          </a:ln>
-          <a:effectLst/>
-        </c:spPr>
-        <c:txPr>
-          <a:bodyPr rot="-60000000" spcFirstLastPara="1" vertOverflow="ellipsis" vert="horz" wrap="square" anchor="ctr" anchorCtr="1"/>
-          <a:lstStyle/>
-          <a:p>
-            <a:pPr>
-              <a:defRPr sz="1197" b="0" i="0" u="none" strike="noStrike" kern="1200" baseline="0">
-                <a:solidFill>
-                  <a:schemeClr val="tx1">
-                    <a:lumMod val="65000"/>
-                    <a:lumOff val="35000"/>
-                  </a:schemeClr>
-                </a:solidFill>
-                <a:latin typeface="+mn-lt"/>
-                <a:ea typeface="+mn-ea"/>
-                <a:cs typeface="+mn-cs"/>
-              </a:defRPr>
-            </a:pPr>
-            <a:endParaRPr lang="pt-BR"/>
-          </a:p>
-        </c:txPr>
-        <c:crossAx val="67523759"/>
-        <c:crosses val="autoZero"/>
-        <c:auto val="1"/>
-        <c:lblAlgn val="ctr"/>
-        <c:lblOffset val="100"/>
-        <c:noMultiLvlLbl val="0"/>
-      </c:catAx>
-      <c:valAx>
-        <c:axId val="67523759"/>
-        <c:scaling>
-          <c:orientation val="minMax"/>
-        </c:scaling>
-        <c:delete val="0"/>
-        <c:axPos val="l"/>
-        <c:majorGridlines>
-          <c:spPr>
-            <a:ln w="9525" cap="flat" cmpd="sng" algn="ctr">
-              <a:solidFill>
-                <a:schemeClr val="tx1">
-                  <a:lumMod val="15000"/>
-                  <a:lumOff val="85000"/>
-                </a:schemeClr>
-              </a:solidFill>
-              <a:round/>
-            </a:ln>
-            <a:effectLst/>
-          </c:spPr>
-        </c:majorGridlines>
-        <c:numFmt formatCode="0.000000" sourceLinked="1"/>
-        <c:majorTickMark val="none"/>
-        <c:minorTickMark val="none"/>
-        <c:tickLblPos val="nextTo"/>
-        <c:spPr>
-          <a:noFill/>
-          <a:ln>
-            <a:noFill/>
-          </a:ln>
-          <a:effectLst/>
-        </c:spPr>
-        <c:txPr>
-          <a:bodyPr rot="-60000000" spcFirstLastPara="1" vertOverflow="ellipsis" vert="horz" wrap="square" anchor="ctr" anchorCtr="1"/>
-          <a:lstStyle/>
-          <a:p>
-            <a:pPr>
-              <a:defRPr sz="1197" b="0" i="0" u="none" strike="noStrike" kern="1200" baseline="0">
-                <a:solidFill>
-                  <a:schemeClr val="tx1">
-                    <a:lumMod val="65000"/>
-                    <a:lumOff val="35000"/>
-                  </a:schemeClr>
-                </a:solidFill>
-                <a:latin typeface="+mn-lt"/>
-                <a:ea typeface="+mn-ea"/>
-                <a:cs typeface="+mn-cs"/>
-              </a:defRPr>
-            </a:pPr>
-            <a:endParaRPr lang="pt-BR"/>
-          </a:p>
-        </c:txPr>
-        <c:crossAx val="67531663"/>
-        <c:crosses val="autoZero"/>
-        <c:crossBetween val="between"/>
-      </c:valAx>
-      <c:spPr>
-        <a:noFill/>
-        <a:ln>
-          <a:noFill/>
-        </a:ln>
-        <a:effectLst/>
-      </c:spPr>
-    </c:plotArea>
-    <c:legend>
-      <c:legendPos val="b"/>
-      <c:overlay val="0"/>
-      <c:spPr>
-        <a:noFill/>
-        <a:ln>
-          <a:noFill/>
-        </a:ln>
-        <a:effectLst/>
-      </c:spPr>
-      <c:txPr>
-        <a:bodyPr rot="0" spcFirstLastPara="1" vertOverflow="ellipsis" vert="horz" wrap="square" anchor="ctr" anchorCtr="1"/>
-        <a:lstStyle/>
-        <a:p>
-          <a:pPr>
-            <a:defRPr sz="1197" b="0" i="0" u="none" strike="noStrike" kern="1200" baseline="0">
-              <a:solidFill>
-                <a:schemeClr val="tx1">
-                  <a:lumMod val="65000"/>
-                  <a:lumOff val="35000"/>
-                </a:schemeClr>
-              </a:solidFill>
-              <a:latin typeface="+mn-lt"/>
-              <a:ea typeface="+mn-ea"/>
-              <a:cs typeface="+mn-cs"/>
-            </a:defRPr>
-          </a:pPr>
-          <a:endParaRPr lang="pt-BR"/>
-        </a:p>
-      </c:txPr>
-    </c:legend>
-    <c:plotVisOnly val="1"/>
-    <c:dispBlanksAs val="gap"/>
-    <c:extLst>
-      <c:ext xmlns:c16r3="http://schemas.microsoft.com/office/drawing/2017/03/chart" uri="{56B9EC1D-385E-4148-901F-78D8002777C0}">
-        <c16r3:dataDisplayOptions16>
-          <c16r3:dispNaAsBlank val="1"/>
-        </c16r3:dataDisplayOptions16>
-      </c:ext>
-    </c:extLst>
-    <c:showDLblsOverMax val="0"/>
-  </c:chart>
-  <c:spPr>
-    <a:noFill/>
-    <a:ln>
-      <a:noFill/>
-    </a:ln>
-    <a:effectLst/>
-  </c:spPr>
-  <c:txPr>
-    <a:bodyPr/>
-    <a:lstStyle/>
-    <a:p>
-      <a:pPr>
-        <a:defRPr/>
-      </a:pPr>
-      <a:endParaRPr lang="pt-BR"/>
-    </a:p>
-  </c:txPr>
-  <c:externalData r:id="rId3">
-    <c:autoUpdate val="0"/>
-  </c:externalData>
-</c:chartSpace>
-</file>
-
-<file path=ppt/charts/chart2.xml><?xml version="1.0" encoding="utf-8"?>
 <c:chartSpace xmlns:c="http://schemas.openxmlformats.org/drawingml/2006/chart" xmlns:a="http://schemas.openxmlformats.org/drawingml/2006/main" xmlns:r="http://schemas.openxmlformats.org/officeDocument/2006/relationships" xmlns:c16r2="http://schemas.microsoft.com/office/drawing/2015/06/chart">
   <c:date1904 val="0"/>
   <c:lang val="pt-BR"/>
@@ -930,6 +511,606 @@
 </c:chartSpace>
 </file>
 
+<file path=ppt/charts/chart2.xml><?xml version="1.0" encoding="utf-8"?>
+<c:chartSpace xmlns:c="http://schemas.openxmlformats.org/drawingml/2006/chart" xmlns:a="http://schemas.openxmlformats.org/drawingml/2006/main" xmlns:r="http://schemas.openxmlformats.org/officeDocument/2006/relationships" xmlns:c16r2="http://schemas.microsoft.com/office/drawing/2015/06/chart">
+  <c:date1904 val="0"/>
+  <c:lang val="pt-BR"/>
+  <c:roundedCorners val="0"/>
+  <mc:AlternateContent xmlns:mc="http://schemas.openxmlformats.org/markup-compatibility/2006">
+    <mc:Choice xmlns:c14="http://schemas.microsoft.com/office/drawing/2007/8/2/chart" Requires="c14">
+      <c14:style val="107"/>
+    </mc:Choice>
+    <mc:Fallback>
+      <c:style val="7"/>
+    </mc:Fallback>
+  </mc:AlternateContent>
+  <c:chart>
+    <c:autoTitleDeleted val="1"/>
+    <c:plotArea>
+      <c:layout/>
+      <c:barChart>
+        <c:barDir val="col"/>
+        <c:grouping val="clustered"/>
+        <c:varyColors val="0"/>
+        <c:ser>
+          <c:idx val="0"/>
+          <c:order val="0"/>
+          <c:tx>
+            <c:strRef>
+              <c:f>Planilha1!$B$1</c:f>
+              <c:strCache>
+                <c:ptCount val="1"/>
+                <c:pt idx="0">
+                  <c:v>Linguagem Assembly</c:v>
+                </c:pt>
+              </c:strCache>
+            </c:strRef>
+          </c:tx>
+          <c:spPr>
+            <a:solidFill>
+              <a:schemeClr val="accent5">
+                <a:tint val="77000"/>
+              </a:schemeClr>
+            </a:solidFill>
+            <a:ln>
+              <a:noFill/>
+            </a:ln>
+            <a:effectLst/>
+          </c:spPr>
+          <c:invertIfNegative val="0"/>
+          <c:dLbls>
+            <c:dLbl>
+              <c:idx val="0"/>
+              <c:layout>
+                <c:manualLayout>
+                  <c:x val="0"/>
+                  <c:y val="1.1918983026637192E-2"/>
+                </c:manualLayout>
+              </c:layout>
+              <c:dLblPos val="outEnd"/>
+              <c:showLegendKey val="0"/>
+              <c:showVal val="1"/>
+              <c:showCatName val="0"/>
+              <c:showSerName val="0"/>
+              <c:showPercent val="0"/>
+              <c:showBubbleSize val="0"/>
+              <c:extLst>
+                <c:ext xmlns:c15="http://schemas.microsoft.com/office/drawing/2012/chart" uri="{CE6537A1-D6FC-4f65-9D91-7224C49458BB}"/>
+                <c:ext xmlns:c16="http://schemas.microsoft.com/office/drawing/2014/chart" uri="{C3380CC4-5D6E-409C-BE32-E72D297353CC}">
+                  <c16:uniqueId val="{00000004-99DC-402C-8A0C-E492729803F7}"/>
+                </c:ext>
+              </c:extLst>
+            </c:dLbl>
+            <c:dLbl>
+              <c:idx val="1"/>
+              <c:layout>
+                <c:manualLayout>
+                  <c:x val="0"/>
+                  <c:y val="1.4315328843791201E-2"/>
+                </c:manualLayout>
+              </c:layout>
+              <c:dLblPos val="outEnd"/>
+              <c:showLegendKey val="0"/>
+              <c:showVal val="1"/>
+              <c:showCatName val="0"/>
+              <c:showSerName val="0"/>
+              <c:showPercent val="0"/>
+              <c:showBubbleSize val="0"/>
+              <c:extLst>
+                <c:ext xmlns:c15="http://schemas.microsoft.com/office/drawing/2012/chart" uri="{CE6537A1-D6FC-4f65-9D91-7224C49458BB}"/>
+                <c:ext xmlns:c16="http://schemas.microsoft.com/office/drawing/2014/chart" uri="{C3380CC4-5D6E-409C-BE32-E72D297353CC}">
+                  <c16:uniqueId val="{00000006-99DC-402C-8A0C-E492729803F7}"/>
+                </c:ext>
+              </c:extLst>
+            </c:dLbl>
+            <c:dLbl>
+              <c:idx val="2"/>
+              <c:layout>
+                <c:manualLayout>
+                  <c:x val="-4.3750000000011456E-4"/>
+                  <c:y val="2.0765254628121641E-3"/>
+                </c:manualLayout>
+              </c:layout>
+              <c:dLblPos val="outEnd"/>
+              <c:showLegendKey val="0"/>
+              <c:showVal val="1"/>
+              <c:showCatName val="0"/>
+              <c:showSerName val="0"/>
+              <c:showPercent val="0"/>
+              <c:showBubbleSize val="0"/>
+              <c:extLst>
+                <c:ext xmlns:c15="http://schemas.microsoft.com/office/drawing/2012/chart" uri="{CE6537A1-D6FC-4f65-9D91-7224C49458BB}"/>
+                <c:ext xmlns:c16="http://schemas.microsoft.com/office/drawing/2014/chart" uri="{C3380CC4-5D6E-409C-BE32-E72D297353CC}">
+                  <c16:uniqueId val="{00000008-99DC-402C-8A0C-E492729803F7}"/>
+                </c:ext>
+              </c:extLst>
+            </c:dLbl>
+            <c:spPr>
+              <a:noFill/>
+              <a:ln>
+                <a:noFill/>
+              </a:ln>
+              <a:effectLst/>
+            </c:spPr>
+            <c:txPr>
+              <a:bodyPr rot="0" spcFirstLastPara="1" vertOverflow="ellipsis" vert="horz" wrap="square" lIns="38100" tIns="19050" rIns="38100" bIns="19050" anchor="ctr" anchorCtr="1">
+                <a:spAutoFit/>
+              </a:bodyPr>
+              <a:lstStyle/>
+              <a:p>
+                <a:pPr>
+                  <a:defRPr sz="1197" b="0" i="0" u="none" strike="noStrike" kern="1200" baseline="0">
+                    <a:solidFill>
+                      <a:schemeClr val="tx1">
+                        <a:lumMod val="75000"/>
+                        <a:lumOff val="25000"/>
+                      </a:schemeClr>
+                    </a:solidFill>
+                    <a:latin typeface="+mn-lt"/>
+                    <a:ea typeface="+mn-ea"/>
+                    <a:cs typeface="+mn-cs"/>
+                  </a:defRPr>
+                </a:pPr>
+                <a:endParaRPr lang="pt-BR"/>
+              </a:p>
+            </c:txPr>
+            <c:dLblPos val="inBase"/>
+            <c:showLegendKey val="0"/>
+            <c:showVal val="1"/>
+            <c:showCatName val="0"/>
+            <c:showSerName val="0"/>
+            <c:showPercent val="0"/>
+            <c:showBubbleSize val="0"/>
+            <c:showLeaderLines val="0"/>
+            <c:extLst>
+              <c:ext xmlns:c15="http://schemas.microsoft.com/office/drawing/2012/chart" uri="{CE6537A1-D6FC-4f65-9D91-7224C49458BB}">
+                <c15:showLeaderLines val="1"/>
+                <c15:leaderLines>
+                  <c:spPr>
+                    <a:ln w="9525" cap="flat" cmpd="sng" algn="ctr">
+                      <a:solidFill>
+                        <a:schemeClr val="tx1">
+                          <a:lumMod val="35000"/>
+                          <a:lumOff val="65000"/>
+                        </a:schemeClr>
+                      </a:solidFill>
+                      <a:round/>
+                    </a:ln>
+                    <a:effectLst/>
+                  </c:spPr>
+                </c15:leaderLines>
+              </c:ext>
+            </c:extLst>
+          </c:dLbls>
+          <c:cat>
+            <c:numRef>
+              <c:f>Planilha1!$A$2:$A$4</c:f>
+              <c:numCache>
+                <c:formatCode>General</c:formatCode>
+                <c:ptCount val="3"/>
+                <c:pt idx="0">
+                  <c:v>50</c:v>
+                </c:pt>
+                <c:pt idx="1">
+                  <c:v>100</c:v>
+                </c:pt>
+                <c:pt idx="2">
+                  <c:v>500</c:v>
+                </c:pt>
+              </c:numCache>
+            </c:numRef>
+          </c:cat>
+          <c:val>
+            <c:numRef>
+              <c:f>Planilha1!$B$2:$B$4</c:f>
+              <c:numCache>
+                <c:formatCode>0.000000</c:formatCode>
+                <c:ptCount val="3"/>
+                <c:pt idx="0">
+                  <c:v>2.745E-4</c:v>
+                </c:pt>
+                <c:pt idx="1">
+                  <c:v>2.2432500000000005E-3</c:v>
+                </c:pt>
+                <c:pt idx="2">
+                  <c:v>0.30316799999999999</c:v>
+                </c:pt>
+              </c:numCache>
+            </c:numRef>
+          </c:val>
+          <c:extLst>
+            <c:ext xmlns:c16="http://schemas.microsoft.com/office/drawing/2014/chart" uri="{C3380CC4-5D6E-409C-BE32-E72D297353CC}">
+              <c16:uniqueId val="{00000000-99DC-402C-8A0C-E492729803F7}"/>
+            </c:ext>
+          </c:extLst>
+        </c:ser>
+        <c:ser>
+          <c:idx val="1"/>
+          <c:order val="1"/>
+          <c:tx>
+            <c:strRef>
+              <c:f>Planilha1!$C$1</c:f>
+              <c:strCache>
+                <c:ptCount val="1"/>
+                <c:pt idx="0">
+                  <c:v>Linguagem C</c:v>
+                </c:pt>
+              </c:strCache>
+            </c:strRef>
+          </c:tx>
+          <c:spPr>
+            <a:solidFill>
+              <a:schemeClr val="accent5">
+                <a:shade val="76000"/>
+              </a:schemeClr>
+            </a:solidFill>
+            <a:ln>
+              <a:noFill/>
+            </a:ln>
+            <a:effectLst/>
+          </c:spPr>
+          <c:invertIfNegative val="0"/>
+          <c:dLbls>
+            <c:dLbl>
+              <c:idx val="0"/>
+              <c:layout>
+                <c:manualLayout>
+                  <c:x val="-2.8645502418044985E-17"/>
+                  <c:y val="1.4457245665769657E-2"/>
+                </c:manualLayout>
+              </c:layout>
+              <c:dLblPos val="outEnd"/>
+              <c:showLegendKey val="0"/>
+              <c:showVal val="1"/>
+              <c:showCatName val="0"/>
+              <c:showSerName val="0"/>
+              <c:showPercent val="0"/>
+              <c:showBubbleSize val="0"/>
+              <c:extLst>
+                <c:ext xmlns:c15="http://schemas.microsoft.com/office/drawing/2012/chart" uri="{CE6537A1-D6FC-4f65-9D91-7224C49458BB}"/>
+                <c:ext xmlns:c16="http://schemas.microsoft.com/office/drawing/2014/chart" uri="{C3380CC4-5D6E-409C-BE32-E72D297353CC}">
+                  <c16:uniqueId val="{00000005-99DC-402C-8A0C-E492729803F7}"/>
+                </c:ext>
+              </c:extLst>
+            </c:dLbl>
+            <c:dLbl>
+              <c:idx val="1"/>
+              <c:layout>
+                <c:manualLayout>
+                  <c:x val="0"/>
+                  <c:y val="1.1207184349951707E-2"/>
+                </c:manualLayout>
+              </c:layout>
+              <c:dLblPos val="outEnd"/>
+              <c:showLegendKey val="0"/>
+              <c:showVal val="1"/>
+              <c:showCatName val="0"/>
+              <c:showSerName val="0"/>
+              <c:showPercent val="0"/>
+              <c:showBubbleSize val="0"/>
+              <c:extLst>
+                <c:ext xmlns:c15="http://schemas.microsoft.com/office/drawing/2012/chart" uri="{CE6537A1-D6FC-4f65-9D91-7224C49458BB}"/>
+                <c:ext xmlns:c16="http://schemas.microsoft.com/office/drawing/2014/chart" uri="{C3380CC4-5D6E-409C-BE32-E72D297353CC}">
+                  <c16:uniqueId val="{00000007-99DC-402C-8A0C-E492729803F7}"/>
+                </c:ext>
+              </c:extLst>
+            </c:dLbl>
+            <c:dLbl>
+              <c:idx val="2"/>
+              <c:layout>
+                <c:manualLayout>
+                  <c:x val="-4.3750000000011456E-4"/>
+                  <c:y val="2.0765254628121641E-3"/>
+                </c:manualLayout>
+              </c:layout>
+              <c:dLblPos val="outEnd"/>
+              <c:showLegendKey val="0"/>
+              <c:showVal val="1"/>
+              <c:showCatName val="0"/>
+              <c:showSerName val="0"/>
+              <c:showPercent val="0"/>
+              <c:showBubbleSize val="0"/>
+              <c:extLst>
+                <c:ext xmlns:c15="http://schemas.microsoft.com/office/drawing/2012/chart" uri="{CE6537A1-D6FC-4f65-9D91-7224C49458BB}"/>
+                <c:ext xmlns:c16="http://schemas.microsoft.com/office/drawing/2014/chart" uri="{C3380CC4-5D6E-409C-BE32-E72D297353CC}">
+                  <c16:uniqueId val="{00000009-99DC-402C-8A0C-E492729803F7}"/>
+                </c:ext>
+              </c:extLst>
+            </c:dLbl>
+            <c:spPr>
+              <a:noFill/>
+              <a:ln>
+                <a:noFill/>
+              </a:ln>
+              <a:effectLst/>
+            </c:spPr>
+            <c:txPr>
+              <a:bodyPr rot="0" spcFirstLastPara="1" vertOverflow="ellipsis" vert="horz" wrap="square" lIns="38100" tIns="19050" rIns="38100" bIns="19050" anchor="ctr" anchorCtr="1">
+                <a:spAutoFit/>
+              </a:bodyPr>
+              <a:lstStyle/>
+              <a:p>
+                <a:pPr>
+                  <a:defRPr sz="1197" b="0" i="0" u="none" strike="noStrike" kern="1200" baseline="0">
+                    <a:solidFill>
+                      <a:schemeClr val="tx1">
+                        <a:lumMod val="75000"/>
+                        <a:lumOff val="25000"/>
+                      </a:schemeClr>
+                    </a:solidFill>
+                    <a:latin typeface="+mn-lt"/>
+                    <a:ea typeface="+mn-ea"/>
+                    <a:cs typeface="+mn-cs"/>
+                  </a:defRPr>
+                </a:pPr>
+                <a:endParaRPr lang="pt-BR"/>
+              </a:p>
+            </c:txPr>
+            <c:dLblPos val="inBase"/>
+            <c:showLegendKey val="0"/>
+            <c:showVal val="1"/>
+            <c:showCatName val="0"/>
+            <c:showSerName val="0"/>
+            <c:showPercent val="0"/>
+            <c:showBubbleSize val="0"/>
+            <c:showLeaderLines val="0"/>
+            <c:extLst>
+              <c:ext xmlns:c15="http://schemas.microsoft.com/office/drawing/2012/chart" uri="{CE6537A1-D6FC-4f65-9D91-7224C49458BB}">
+                <c15:showLeaderLines val="1"/>
+                <c15:leaderLines>
+                  <c:spPr>
+                    <a:ln w="9525" cap="flat" cmpd="sng" algn="ctr">
+                      <a:solidFill>
+                        <a:schemeClr val="tx1">
+                          <a:lumMod val="35000"/>
+                          <a:lumOff val="65000"/>
+                        </a:schemeClr>
+                      </a:solidFill>
+                      <a:round/>
+                    </a:ln>
+                    <a:effectLst/>
+                  </c:spPr>
+                </c15:leaderLines>
+              </c:ext>
+            </c:extLst>
+          </c:dLbls>
+          <c:cat>
+            <c:numRef>
+              <c:f>Planilha1!$A$2:$A$4</c:f>
+              <c:numCache>
+                <c:formatCode>General</c:formatCode>
+                <c:ptCount val="3"/>
+                <c:pt idx="0">
+                  <c:v>50</c:v>
+                </c:pt>
+                <c:pt idx="1">
+                  <c:v>100</c:v>
+                </c:pt>
+                <c:pt idx="2">
+                  <c:v>500</c:v>
+                </c:pt>
+              </c:numCache>
+            </c:numRef>
+          </c:cat>
+          <c:val>
+            <c:numRef>
+              <c:f>Planilha1!$C$2:$C$4</c:f>
+              <c:numCache>
+                <c:formatCode>0.000000</c:formatCode>
+                <c:ptCount val="3"/>
+                <c:pt idx="0">
+                  <c:v>4.7100000000000001E-4</c:v>
+                </c:pt>
+                <c:pt idx="1">
+                  <c:v>3.718E-3</c:v>
+                </c:pt>
+                <c:pt idx="2">
+                  <c:v>0.58710649999999998</c:v>
+                </c:pt>
+              </c:numCache>
+            </c:numRef>
+          </c:val>
+          <c:extLst>
+            <c:ext xmlns:c16="http://schemas.microsoft.com/office/drawing/2014/chart" uri="{C3380CC4-5D6E-409C-BE32-E72D297353CC}">
+              <c16:uniqueId val="{00000001-99DC-402C-8A0C-E492729803F7}"/>
+            </c:ext>
+          </c:extLst>
+        </c:ser>
+        <c:dLbls>
+          <c:dLblPos val="inBase"/>
+          <c:showLegendKey val="0"/>
+          <c:showVal val="1"/>
+          <c:showCatName val="0"/>
+          <c:showSerName val="0"/>
+          <c:showPercent val="0"/>
+          <c:showBubbleSize val="0"/>
+        </c:dLbls>
+        <c:gapWidth val="219"/>
+        <c:overlap val="-27"/>
+        <c:axId val="2074457839"/>
+        <c:axId val="2074447439"/>
+      </c:barChart>
+      <c:catAx>
+        <c:axId val="2074457839"/>
+        <c:scaling>
+          <c:orientation val="minMax"/>
+        </c:scaling>
+        <c:delete val="0"/>
+        <c:axPos val="b"/>
+        <c:numFmt formatCode="General" sourceLinked="1"/>
+        <c:majorTickMark val="none"/>
+        <c:minorTickMark val="none"/>
+        <c:tickLblPos val="nextTo"/>
+        <c:spPr>
+          <a:noFill/>
+          <a:ln w="9525" cap="flat" cmpd="sng" algn="ctr">
+            <a:solidFill>
+              <a:schemeClr val="tx1">
+                <a:lumMod val="15000"/>
+                <a:lumOff val="85000"/>
+              </a:schemeClr>
+            </a:solidFill>
+            <a:round/>
+          </a:ln>
+          <a:effectLst/>
+        </c:spPr>
+        <c:txPr>
+          <a:bodyPr rot="-60000000" spcFirstLastPara="1" vertOverflow="ellipsis" vert="horz" wrap="square" anchor="ctr" anchorCtr="1"/>
+          <a:lstStyle/>
+          <a:p>
+            <a:pPr>
+              <a:defRPr sz="1197" b="0" i="0" u="none" strike="noStrike" kern="1200" baseline="0">
+                <a:solidFill>
+                  <a:schemeClr val="tx1">
+                    <a:lumMod val="65000"/>
+                    <a:lumOff val="35000"/>
+                  </a:schemeClr>
+                </a:solidFill>
+                <a:latin typeface="+mn-lt"/>
+                <a:ea typeface="+mn-ea"/>
+                <a:cs typeface="+mn-cs"/>
+              </a:defRPr>
+            </a:pPr>
+            <a:endParaRPr lang="pt-BR"/>
+          </a:p>
+        </c:txPr>
+        <c:crossAx val="2074447439"/>
+        <c:crosses val="autoZero"/>
+        <c:auto val="1"/>
+        <c:lblAlgn val="ctr"/>
+        <c:lblOffset val="100"/>
+        <c:noMultiLvlLbl val="0"/>
+      </c:catAx>
+      <c:valAx>
+        <c:axId val="2074447439"/>
+        <c:scaling>
+          <c:orientation val="minMax"/>
+          <c:max val="7.0000000000000019E-3"/>
+        </c:scaling>
+        <c:delete val="0"/>
+        <c:axPos val="l"/>
+        <c:majorGridlines>
+          <c:spPr>
+            <a:ln w="9525" cap="flat" cmpd="sng" algn="ctr">
+              <a:solidFill>
+                <a:schemeClr val="tx1">
+                  <a:lumMod val="15000"/>
+                  <a:lumOff val="85000"/>
+                </a:schemeClr>
+              </a:solidFill>
+              <a:round/>
+            </a:ln>
+            <a:effectLst/>
+          </c:spPr>
+        </c:majorGridlines>
+        <c:numFmt formatCode="0.000000" sourceLinked="1"/>
+        <c:majorTickMark val="none"/>
+        <c:minorTickMark val="none"/>
+        <c:tickLblPos val="nextTo"/>
+        <c:spPr>
+          <a:noFill/>
+          <a:ln>
+            <a:noFill/>
+          </a:ln>
+          <a:effectLst/>
+        </c:spPr>
+        <c:txPr>
+          <a:bodyPr rot="-60000000" spcFirstLastPara="1" vertOverflow="ellipsis" vert="horz" wrap="square" anchor="ctr" anchorCtr="1"/>
+          <a:lstStyle/>
+          <a:p>
+            <a:pPr>
+              <a:defRPr sz="1197" b="0" i="0" u="none" strike="noStrike" kern="1200" baseline="0">
+                <a:solidFill>
+                  <a:schemeClr val="tx1">
+                    <a:lumMod val="65000"/>
+                    <a:lumOff val="35000"/>
+                  </a:schemeClr>
+                </a:solidFill>
+                <a:latin typeface="+mn-lt"/>
+                <a:ea typeface="+mn-ea"/>
+                <a:cs typeface="+mn-cs"/>
+              </a:defRPr>
+            </a:pPr>
+            <a:endParaRPr lang="pt-BR"/>
+          </a:p>
+        </c:txPr>
+        <c:crossAx val="2074457839"/>
+        <c:crosses val="autoZero"/>
+        <c:crossBetween val="between"/>
+      </c:valAx>
+      <c:spPr>
+        <a:noFill/>
+        <a:ln>
+          <a:noFill/>
+        </a:ln>
+        <a:effectLst/>
+      </c:spPr>
+    </c:plotArea>
+    <c:legend>
+      <c:legendPos val="b"/>
+      <c:overlay val="0"/>
+      <c:spPr>
+        <a:noFill/>
+        <a:ln>
+          <a:noFill/>
+        </a:ln>
+        <a:effectLst/>
+      </c:spPr>
+      <c:txPr>
+        <a:bodyPr rot="0" spcFirstLastPara="1" vertOverflow="ellipsis" vert="horz" wrap="square" anchor="ctr" anchorCtr="1"/>
+        <a:lstStyle/>
+        <a:p>
+          <a:pPr>
+            <a:defRPr sz="1197" b="0" i="0" u="none" strike="noStrike" kern="1200" baseline="0">
+              <a:solidFill>
+                <a:schemeClr val="tx1">
+                  <a:lumMod val="65000"/>
+                  <a:lumOff val="35000"/>
+                </a:schemeClr>
+              </a:solidFill>
+              <a:latin typeface="+mn-lt"/>
+              <a:ea typeface="+mn-ea"/>
+              <a:cs typeface="+mn-cs"/>
+            </a:defRPr>
+          </a:pPr>
+          <a:endParaRPr lang="pt-BR"/>
+        </a:p>
+      </c:txPr>
+    </c:legend>
+    <c:plotVisOnly val="1"/>
+    <c:dispBlanksAs val="gap"/>
+    <c:extLst>
+      <c:ext xmlns:c16r3="http://schemas.microsoft.com/office/drawing/2017/03/chart" uri="{56B9EC1D-385E-4148-901F-78D8002777C0}">
+        <c16r3:dataDisplayOptions16>
+          <c16r3:dispNaAsBlank val="1"/>
+        </c16r3:dataDisplayOptions16>
+      </c:ext>
+    </c:extLst>
+    <c:showDLblsOverMax val="0"/>
+  </c:chart>
+  <c:spPr>
+    <a:noFill/>
+    <a:ln>
+      <a:noFill/>
+    </a:ln>
+    <a:effectLst/>
+  </c:spPr>
+  <c:txPr>
+    <a:bodyPr/>
+    <a:lstStyle/>
+    <a:p>
+      <a:pPr>
+        <a:defRPr/>
+      </a:pPr>
+      <a:endParaRPr lang="pt-BR"/>
+    </a:p>
+  </c:txPr>
+  <c:externalData r:id="rId3">
+    <c:autoUpdate val="0"/>
+  </c:externalData>
+</c:chartSpace>
+</file>
+
 <file path=ppt/charts/colors1.xml><?xml version="1.0" encoding="utf-8"?>
 <cs:colorStyle xmlns:cs="http://schemas.microsoft.com/office/drawing/2012/chartStyle" xmlns:a="http://schemas.openxmlformats.org/drawingml/2006/main" meth="cycle" id="10">
   <a:schemeClr val="accent1"/>
@@ -971,47 +1152,13 @@
 </file>
 
 <file path=ppt/charts/colors2.xml><?xml version="1.0" encoding="utf-8"?>
-<cs:colorStyle xmlns:cs="http://schemas.microsoft.com/office/drawing/2012/chartStyle" xmlns:a="http://schemas.openxmlformats.org/drawingml/2006/main" meth="cycle" id="10">
-  <a:schemeClr val="accent1"/>
-  <a:schemeClr val="accent2"/>
-  <a:schemeClr val="accent3"/>
-  <a:schemeClr val="accent4"/>
+<cs:colorStyle xmlns:cs="http://schemas.microsoft.com/office/drawing/2012/chartStyle" xmlns:a="http://schemas.openxmlformats.org/drawingml/2006/main" meth="withinLinearReversed" id="25">
   <a:schemeClr val="accent5"/>
-  <a:schemeClr val="accent6"/>
-  <cs:variation/>
-  <cs:variation>
-    <a:lumMod val="60000"/>
-  </cs:variation>
-  <cs:variation>
-    <a:lumMod val="80000"/>
-    <a:lumOff val="20000"/>
-  </cs:variation>
-  <cs:variation>
-    <a:lumMod val="80000"/>
-  </cs:variation>
-  <cs:variation>
-    <a:lumMod val="60000"/>
-    <a:lumOff val="40000"/>
-  </cs:variation>
-  <cs:variation>
-    <a:lumMod val="50000"/>
-  </cs:variation>
-  <cs:variation>
-    <a:lumMod val="70000"/>
-    <a:lumOff val="30000"/>
-  </cs:variation>
-  <cs:variation>
-    <a:lumMod val="70000"/>
-  </cs:variation>
-  <cs:variation>
-    <a:lumMod val="50000"/>
-    <a:lumOff val="50000"/>
-  </cs:variation>
 </cs:colorStyle>
 </file>
 
 <file path=ppt/charts/style1.xml><?xml version="1.0" encoding="utf-8"?>
-<cs:chartStyle xmlns:cs="http://schemas.microsoft.com/office/drawing/2012/chartStyle" xmlns:a="http://schemas.openxmlformats.org/drawingml/2006/main" id="201">
+<cs:chartStyle xmlns:cs="http://schemas.microsoft.com/office/drawing/2012/chartStyle" xmlns:a="http://schemas.openxmlformats.org/drawingml/2006/main" id="227">
   <cs:axisTitle>
     <cs:lnRef idx="0"/>
     <cs:fillRef idx="0"/>
@@ -1119,6 +1266,11 @@
     <cs:fontRef idx="minor">
       <a:schemeClr val="tx1"/>
     </cs:fontRef>
+    <cs:spPr>
+      <a:solidFill>
+        <a:schemeClr val="phClr"/>
+      </a:solidFill>
+    </cs:spPr>
   </cs:dataPoint>
   <cs:dataPoint3D>
     <cs:lnRef idx="0"/>
@@ -1129,6 +1281,11 @@
     <cs:fontRef idx="minor">
       <a:schemeClr val="tx1"/>
     </cs:fontRef>
+    <cs:spPr>
+      <a:solidFill>
+        <a:schemeClr val="phClr"/>
+      </a:solidFill>
+    </cs:spPr>
   </cs:dataPoint3D>
   <cs:dataPointLine>
     <cs:lnRef idx="0">
@@ -1160,6 +1317,9 @@
       <a:schemeClr val="tx1"/>
     </cs:fontRef>
     <cs:spPr>
+      <a:solidFill>
+        <a:schemeClr val="phClr"/>
+      </a:solidFill>
       <a:ln w="9525">
         <a:solidFill>
           <a:schemeClr val="phClr"/>
@@ -1514,7 +1674,7 @@
 </file>
 
 <file path=ppt/charts/style2.xml><?xml version="1.0" encoding="utf-8"?>
-<cs:chartStyle xmlns:cs="http://schemas.microsoft.com/office/drawing/2012/chartStyle" xmlns:a="http://schemas.openxmlformats.org/drawingml/2006/main" id="227">
+<cs:chartStyle xmlns:cs="http://schemas.microsoft.com/office/drawing/2012/chartStyle" xmlns:a="http://schemas.openxmlformats.org/drawingml/2006/main" id="201">
   <cs:axisTitle>
     <cs:lnRef idx="0"/>
     <cs:fillRef idx="0"/>
@@ -1622,11 +1782,6 @@
     <cs:fontRef idx="minor">
       <a:schemeClr val="tx1"/>
     </cs:fontRef>
-    <cs:spPr>
-      <a:solidFill>
-        <a:schemeClr val="phClr"/>
-      </a:solidFill>
-    </cs:spPr>
   </cs:dataPoint>
   <cs:dataPoint3D>
     <cs:lnRef idx="0"/>
@@ -1637,11 +1792,6 @@
     <cs:fontRef idx="minor">
       <a:schemeClr val="tx1"/>
     </cs:fontRef>
-    <cs:spPr>
-      <a:solidFill>
-        <a:schemeClr val="phClr"/>
-      </a:solidFill>
-    </cs:spPr>
   </cs:dataPoint3D>
   <cs:dataPointLine>
     <cs:lnRef idx="0">
@@ -1673,9 +1823,6 @@
       <a:schemeClr val="tx1"/>
     </cs:fontRef>
     <cs:spPr>
-      <a:solidFill>
-        <a:schemeClr val="phClr"/>
-      </a:solidFill>
       <a:ln w="9525">
         <a:solidFill>
           <a:schemeClr val="phClr"/>
@@ -2176,7 +2323,7 @@
           <a:p>
             <a:fld id="{0474973F-9CEB-4D42-9D48-18C261C29AA6}" type="datetimeFigureOut">
               <a:rPr lang="pt-BR" smtClean="0"/>
-              <a:t>21/03/2021</a:t>
+              <a:t>23/03/2021</a:t>
             </a:fld>
             <a:endParaRPr lang="pt-BR"/>
           </a:p>
@@ -2374,7 +2521,7 @@
           <a:p>
             <a:fld id="{0474973F-9CEB-4D42-9D48-18C261C29AA6}" type="datetimeFigureOut">
               <a:rPr lang="pt-BR" smtClean="0"/>
-              <a:t>21/03/2021</a:t>
+              <a:t>23/03/2021</a:t>
             </a:fld>
             <a:endParaRPr lang="pt-BR"/>
           </a:p>
@@ -2582,7 +2729,7 @@
           <a:p>
             <a:fld id="{0474973F-9CEB-4D42-9D48-18C261C29AA6}" type="datetimeFigureOut">
               <a:rPr lang="pt-BR" smtClean="0"/>
-              <a:t>21/03/2021</a:t>
+              <a:t>23/03/2021</a:t>
             </a:fld>
             <a:endParaRPr lang="pt-BR"/>
           </a:p>
@@ -2780,7 +2927,7 @@
           <a:p>
             <a:fld id="{0474973F-9CEB-4D42-9D48-18C261C29AA6}" type="datetimeFigureOut">
               <a:rPr lang="pt-BR" smtClean="0"/>
-              <a:t>21/03/2021</a:t>
+              <a:t>23/03/2021</a:t>
             </a:fld>
             <a:endParaRPr lang="pt-BR"/>
           </a:p>
@@ -3055,7 +3202,7 @@
           <a:p>
             <a:fld id="{0474973F-9CEB-4D42-9D48-18C261C29AA6}" type="datetimeFigureOut">
               <a:rPr lang="pt-BR" smtClean="0"/>
-              <a:t>21/03/2021</a:t>
+              <a:t>23/03/2021</a:t>
             </a:fld>
             <a:endParaRPr lang="pt-BR"/>
           </a:p>
@@ -3320,7 +3467,7 @@
           <a:p>
             <a:fld id="{0474973F-9CEB-4D42-9D48-18C261C29AA6}" type="datetimeFigureOut">
               <a:rPr lang="pt-BR" smtClean="0"/>
-              <a:t>21/03/2021</a:t>
+              <a:t>23/03/2021</a:t>
             </a:fld>
             <a:endParaRPr lang="pt-BR"/>
           </a:p>
@@ -3732,7 +3879,7 @@
           <a:p>
             <a:fld id="{0474973F-9CEB-4D42-9D48-18C261C29AA6}" type="datetimeFigureOut">
               <a:rPr lang="pt-BR" smtClean="0"/>
-              <a:t>21/03/2021</a:t>
+              <a:t>23/03/2021</a:t>
             </a:fld>
             <a:endParaRPr lang="pt-BR"/>
           </a:p>
@@ -3873,7 +4020,7 @@
           <a:p>
             <a:fld id="{0474973F-9CEB-4D42-9D48-18C261C29AA6}" type="datetimeFigureOut">
               <a:rPr lang="pt-BR" smtClean="0"/>
-              <a:t>21/03/2021</a:t>
+              <a:t>23/03/2021</a:t>
             </a:fld>
             <a:endParaRPr lang="pt-BR"/>
           </a:p>
@@ -3986,7 +4133,7 @@
           <a:p>
             <a:fld id="{0474973F-9CEB-4D42-9D48-18C261C29AA6}" type="datetimeFigureOut">
               <a:rPr lang="pt-BR" smtClean="0"/>
-              <a:t>21/03/2021</a:t>
+              <a:t>23/03/2021</a:t>
             </a:fld>
             <a:endParaRPr lang="pt-BR"/>
           </a:p>
@@ -4297,7 +4444,7 @@
           <a:p>
             <a:fld id="{0474973F-9CEB-4D42-9D48-18C261C29AA6}" type="datetimeFigureOut">
               <a:rPr lang="pt-BR" smtClean="0"/>
-              <a:t>21/03/2021</a:t>
+              <a:t>23/03/2021</a:t>
             </a:fld>
             <a:endParaRPr lang="pt-BR"/>
           </a:p>
@@ -4585,7 +4732,7 @@
           <a:p>
             <a:fld id="{0474973F-9CEB-4D42-9D48-18C261C29AA6}" type="datetimeFigureOut">
               <a:rPr lang="pt-BR" smtClean="0"/>
-              <a:t>21/03/2021</a:t>
+              <a:t>23/03/2021</a:t>
             </a:fld>
             <a:endParaRPr lang="pt-BR"/>
           </a:p>
@@ -4826,7 +4973,7 @@
           <a:p>
             <a:fld id="{0474973F-9CEB-4D42-9D48-18C261C29AA6}" type="datetimeFigureOut">
               <a:rPr lang="pt-BR" smtClean="0"/>
-              <a:t>21/03/2021</a:t>
+              <a:t>23/03/2021</a:t>
             </a:fld>
             <a:endParaRPr lang="pt-BR"/>
           </a:p>
@@ -5245,10 +5392,10 @@
       </p:grpSpPr>
       <p:graphicFrame>
         <p:nvGraphicFramePr>
-          <p:cNvPr id="4" name="Gráfico 3">
-            <a:extLst>
-              <a:ext uri="{FF2B5EF4-FFF2-40B4-BE49-F238E27FC236}">
-                <a16:creationId xmlns:a16="http://schemas.microsoft.com/office/drawing/2014/main" id="{F72BDC71-B556-4D0D-8D5D-B17AEAF04E5E}"/>
+          <p:cNvPr id="7" name="Gráfico 6">
+            <a:extLst>
+              <a:ext uri="{FF2B5EF4-FFF2-40B4-BE49-F238E27FC236}">
+                <a16:creationId xmlns:a16="http://schemas.microsoft.com/office/drawing/2014/main" id="{8DC096E1-0444-43FF-91DC-F8CF3257B3DC}"/>
               </a:ext>
             </a:extLst>
           </p:cNvPr>
@@ -5256,7 +5403,7 @@
           <p:nvPr>
             <p:extLst>
               <p:ext uri="{D42A27DB-BD31-4B8C-83A1-F6EECF244321}">
-                <p14:modId xmlns:p14="http://schemas.microsoft.com/office/powerpoint/2010/main" val="444236990"/>
+                <p14:modId xmlns:p14="http://schemas.microsoft.com/office/powerpoint/2010/main" val="2168021186"/>
               </p:ext>
             </p:extLst>
           </p:nvPr>
@@ -5274,7 +5421,7 @@
     </p:spTree>
     <p:extLst>
       <p:ext uri="{BB962C8B-B14F-4D97-AF65-F5344CB8AC3E}">
-        <p14:creationId xmlns:p14="http://schemas.microsoft.com/office/powerpoint/2010/main" val="3970193793"/>
+        <p14:creationId xmlns:p14="http://schemas.microsoft.com/office/powerpoint/2010/main" val="3314041888"/>
       </p:ext>
     </p:extLst>
   </p:cSld>
@@ -5303,10 +5450,10 @@
       </p:grpSpPr>
       <p:graphicFrame>
         <p:nvGraphicFramePr>
-          <p:cNvPr id="7" name="Gráfico 6">
-            <a:extLst>
-              <a:ext uri="{FF2B5EF4-FFF2-40B4-BE49-F238E27FC236}">
-                <a16:creationId xmlns:a16="http://schemas.microsoft.com/office/drawing/2014/main" id="{8DC096E1-0444-43FF-91DC-F8CF3257B3DC}"/>
+          <p:cNvPr id="13" name="Gráfico 12">
+            <a:extLst>
+              <a:ext uri="{FF2B5EF4-FFF2-40B4-BE49-F238E27FC236}">
+                <a16:creationId xmlns:a16="http://schemas.microsoft.com/office/drawing/2014/main" id="{B6D86429-6565-41E2-A3D5-676FF70B4F10}"/>
               </a:ext>
             </a:extLst>
           </p:cNvPr>
@@ -5314,7 +5461,7 @@
           <p:nvPr>
             <p:extLst>
               <p:ext uri="{D42A27DB-BD31-4B8C-83A1-F6EECF244321}">
-                <p14:modId xmlns:p14="http://schemas.microsoft.com/office/powerpoint/2010/main" val="22754297"/>
+                <p14:modId xmlns:p14="http://schemas.microsoft.com/office/powerpoint/2010/main" val="962422136"/>
               </p:ext>
             </p:extLst>
           </p:nvPr>
@@ -5332,7 +5479,7 @@
     </p:spTree>
     <p:extLst>
       <p:ext uri="{BB962C8B-B14F-4D97-AF65-F5344CB8AC3E}">
-        <p14:creationId xmlns:p14="http://schemas.microsoft.com/office/powerpoint/2010/main" val="3314041888"/>
+        <p14:creationId xmlns:p14="http://schemas.microsoft.com/office/powerpoint/2010/main" val="1485213280"/>
       </p:ext>
     </p:extLst>
   </p:cSld>

</xml_diff>